<commit_message>
update sections of data science
</commit_message>
<xml_diff>
--- a/4 Data Science.pptx
+++ b/4 Data Science.pptx
@@ -5,51 +5,52 @@
     <p:sldMasterId id="2147483658" r:id="rId1"/>
   </p:sldMasterIdLst>
   <p:notesMasterIdLst>
-    <p:notesMasterId r:id="rId12"/>
+    <p:notesMasterId r:id="rId13"/>
   </p:notesMasterIdLst>
   <p:handoutMasterIdLst>
-    <p:handoutMasterId r:id="rId13"/>
+    <p:handoutMasterId r:id="rId14"/>
   </p:handoutMasterIdLst>
   <p:sldIdLst>
     <p:sldId id="256" r:id="rId2"/>
     <p:sldId id="332" r:id="rId3"/>
-    <p:sldId id="289" r:id="rId4"/>
-    <p:sldId id="337" r:id="rId5"/>
-    <p:sldId id="338" r:id="rId6"/>
-    <p:sldId id="339" r:id="rId7"/>
-    <p:sldId id="334" r:id="rId8"/>
-    <p:sldId id="335" r:id="rId9"/>
-    <p:sldId id="340" r:id="rId10"/>
-    <p:sldId id="280" r:id="rId11"/>
+    <p:sldId id="341" r:id="rId4"/>
+    <p:sldId id="289" r:id="rId5"/>
+    <p:sldId id="337" r:id="rId6"/>
+    <p:sldId id="338" r:id="rId7"/>
+    <p:sldId id="339" r:id="rId8"/>
+    <p:sldId id="334" r:id="rId9"/>
+    <p:sldId id="335" r:id="rId10"/>
+    <p:sldId id="340" r:id="rId11"/>
+    <p:sldId id="280" r:id="rId12"/>
   </p:sldIdLst>
   <p:sldSz cx="9144000" cy="5143500" type="screen16x9"/>
   <p:notesSz cx="6858000" cy="9144000"/>
   <p:embeddedFontLst>
     <p:embeddedFont>
       <p:font typeface="Consolas" panose="020B0609020204030204" pitchFamily="49" charset="0"/>
-      <p:regular r:id="rId14"/>
-      <p:bold r:id="rId15"/>
-      <p:italic r:id="rId16"/>
-      <p:boldItalic r:id="rId17"/>
+      <p:regular r:id="rId15"/>
+      <p:bold r:id="rId16"/>
+      <p:italic r:id="rId17"/>
+      <p:boldItalic r:id="rId18"/>
     </p:embeddedFont>
     <p:embeddedFont>
       <p:font typeface="Roboto Slab" panose="020B0604020202020204" charset="0"/>
-      <p:regular r:id="rId18"/>
-      <p:bold r:id="rId19"/>
+      <p:regular r:id="rId19"/>
+      <p:bold r:id="rId20"/>
     </p:embeddedFont>
     <p:embeddedFont>
       <p:font typeface="Source Sans Pro" panose="020B0503030403020204" pitchFamily="34" charset="0"/>
-      <p:regular r:id="rId20"/>
-      <p:bold r:id="rId21"/>
-      <p:italic r:id="rId22"/>
-      <p:boldItalic r:id="rId23"/>
+      <p:regular r:id="rId21"/>
+      <p:bold r:id="rId22"/>
+      <p:italic r:id="rId23"/>
+      <p:boldItalic r:id="rId24"/>
     </p:embeddedFont>
     <p:embeddedFont>
       <p:font typeface="Trebuchet MS" panose="020B0603020202020204" pitchFamily="34" charset="0"/>
-      <p:regular r:id="rId24"/>
-      <p:bold r:id="rId25"/>
-      <p:italic r:id="rId26"/>
-      <p:boldItalic r:id="rId27"/>
+      <p:regular r:id="rId25"/>
+      <p:bold r:id="rId26"/>
+      <p:italic r:id="rId27"/>
+      <p:boldItalic r:id="rId28"/>
     </p:embeddedFont>
   </p:embeddedFontLst>
   <p:defaultTextStyle>
@@ -7587,7 +7588,7 @@
     </p:spTree>
     <p:extLst>
       <p:ext uri="{BB962C8B-B14F-4D97-AF65-F5344CB8AC3E}">
-        <p14:creationId xmlns:p14="http://schemas.microsoft.com/office/powerpoint/2010/main" val="1103887049"/>
+        <p14:creationId xmlns:p14="http://schemas.microsoft.com/office/powerpoint/2010/main" val="1545030597"/>
       </p:ext>
     </p:extLst>
   </p:cSld>
@@ -7696,7 +7697,7 @@
     </p:spTree>
     <p:extLst>
       <p:ext uri="{BB962C8B-B14F-4D97-AF65-F5344CB8AC3E}">
-        <p14:creationId xmlns:p14="http://schemas.microsoft.com/office/powerpoint/2010/main" val="3390362646"/>
+        <p14:creationId xmlns:p14="http://schemas.microsoft.com/office/powerpoint/2010/main" val="1103887049"/>
       </p:ext>
     </p:extLst>
   </p:cSld>
@@ -7805,6 +7806,115 @@
     </p:spTree>
     <p:extLst>
       <p:ext uri="{BB962C8B-B14F-4D97-AF65-F5344CB8AC3E}">
+        <p14:creationId xmlns:p14="http://schemas.microsoft.com/office/powerpoint/2010/main" val="3390362646"/>
+      </p:ext>
+    </p:extLst>
+  </p:cSld>
+  <p:clrMapOvr>
+    <a:masterClrMapping/>
+  </p:clrMapOvr>
+</p:notes>
+</file>
+
+<file path=ppt/notesSlides/notesSlide6.xml><?xml version="1.0" encoding="utf-8"?>
+<p:notes xmlns:a="http://schemas.openxmlformats.org/drawingml/2006/main" xmlns:r="http://schemas.openxmlformats.org/officeDocument/2006/relationships" xmlns:p="http://schemas.openxmlformats.org/presentationml/2006/main" showMasterSp="0" showMasterPhAnim="0">
+  <p:cSld>
+    <p:spTree>
+      <p:nvGrpSpPr>
+        <p:cNvPr id="1" name="Shape 93"/>
+        <p:cNvGrpSpPr/>
+        <p:nvPr/>
+      </p:nvGrpSpPr>
+      <p:grpSpPr>
+        <a:xfrm>
+          <a:off x="0" y="0"/>
+          <a:ext cx="0" cy="0"/>
+          <a:chOff x="0" y="0"/>
+          <a:chExt cx="0" cy="0"/>
+        </a:xfrm>
+      </p:grpSpPr>
+      <p:sp>
+        <p:nvSpPr>
+          <p:cNvPr id="94" name="Google Shape;94;g35f391192_029:notes"/>
+          <p:cNvSpPr>
+            <a:spLocks noGrp="1" noRot="1" noChangeAspect="1"/>
+          </p:cNvSpPr>
+          <p:nvPr>
+            <p:ph type="sldImg" idx="2"/>
+          </p:nvPr>
+        </p:nvSpPr>
+        <p:spPr>
+          <a:xfrm>
+            <a:off x="381000" y="685800"/>
+            <a:ext cx="6096000" cy="3429000"/>
+          </a:xfrm>
+          <a:custGeom>
+            <a:avLst/>
+            <a:gdLst/>
+            <a:ahLst/>
+            <a:cxnLst/>
+            <a:rect l="l" t="t" r="r" b="b"/>
+            <a:pathLst>
+              <a:path w="120000" h="120000" extrusionOk="0">
+                <a:moveTo>
+                  <a:pt x="0" y="0"/>
+                </a:moveTo>
+                <a:lnTo>
+                  <a:pt x="120000" y="0"/>
+                </a:lnTo>
+                <a:lnTo>
+                  <a:pt x="120000" y="120000"/>
+                </a:lnTo>
+                <a:lnTo>
+                  <a:pt x="0" y="120000"/>
+                </a:lnTo>
+                <a:close/>
+              </a:path>
+            </a:pathLst>
+          </a:custGeom>
+        </p:spPr>
+      </p:sp>
+      <p:sp>
+        <p:nvSpPr>
+          <p:cNvPr id="95" name="Google Shape;95;g35f391192_029:notes"/>
+          <p:cNvSpPr txBox="1">
+            <a:spLocks noGrp="1"/>
+          </p:cNvSpPr>
+          <p:nvPr>
+            <p:ph type="body" idx="1"/>
+          </p:nvPr>
+        </p:nvSpPr>
+        <p:spPr>
+          <a:xfrm>
+            <a:off x="685800" y="4343400"/>
+            <a:ext cx="5486400" cy="4114800"/>
+          </a:xfrm>
+          <a:prstGeom prst="rect">
+            <a:avLst/>
+          </a:prstGeom>
+        </p:spPr>
+        <p:txBody>
+          <a:bodyPr spcFirstLastPara="1" wrap="square" lIns="91425" tIns="91425" rIns="91425" bIns="91425" anchor="t" anchorCtr="0">
+            <a:noAutofit/>
+          </a:bodyPr>
+          <a:lstStyle/>
+          <a:p>
+            <a:pPr marL="0" lvl="0" indent="0" algn="l" rtl="0">
+              <a:spcBef>
+                <a:spcPts val="0"/>
+              </a:spcBef>
+              <a:spcAft>
+                <a:spcPts val="0"/>
+              </a:spcAft>
+              <a:buNone/>
+            </a:pPr>
+            <a:endParaRPr/>
+          </a:p>
+        </p:txBody>
+      </p:sp>
+    </p:spTree>
+    <p:extLst>
+      <p:ext uri="{BB962C8B-B14F-4D97-AF65-F5344CB8AC3E}">
         <p14:creationId xmlns:p14="http://schemas.microsoft.com/office/powerpoint/2010/main" val="1150731996"/>
       </p:ext>
     </p:extLst>
@@ -7815,7 +7925,7 @@
 </p:notes>
 </file>
 
-<file path=ppt/notesSlides/notesSlide6.xml><?xml version="1.0" encoding="utf-8"?>
+<file path=ppt/notesSlides/notesSlide7.xml><?xml version="1.0" encoding="utf-8"?>
 <p:notes xmlns:a="http://schemas.openxmlformats.org/drawingml/2006/main" xmlns:r="http://schemas.openxmlformats.org/officeDocument/2006/relationships" xmlns:p="http://schemas.openxmlformats.org/presentationml/2006/main" showMasterSp="0" showMasterPhAnim="0">
   <p:cSld>
     <p:spTree>
@@ -11109,6 +11219,135 @@
   <p:cSld>
     <p:spTree>
       <p:nvGrpSpPr>
+        <p:cNvPr id="1" name="Shape 96"/>
+        <p:cNvGrpSpPr/>
+        <p:nvPr/>
+      </p:nvGrpSpPr>
+      <p:grpSpPr>
+        <a:xfrm>
+          <a:off x="0" y="0"/>
+          <a:ext cx="0" cy="0"/>
+          <a:chOff x="0" y="0"/>
+          <a:chExt cx="0" cy="0"/>
+        </a:xfrm>
+      </p:grpSpPr>
+      <p:sp>
+        <p:nvSpPr>
+          <p:cNvPr id="97" name="Google Shape;97;p15"/>
+          <p:cNvSpPr txBox="1">
+            <a:spLocks noGrp="1"/>
+          </p:cNvSpPr>
+          <p:nvPr>
+            <p:ph type="ctrTitle"/>
+          </p:nvPr>
+        </p:nvSpPr>
+        <p:spPr>
+          <a:xfrm>
+            <a:off x="1655700" y="1991850"/>
+            <a:ext cx="5832600" cy="1159800"/>
+          </a:xfrm>
+          <a:prstGeom prst="rect">
+            <a:avLst/>
+          </a:prstGeom>
+        </p:spPr>
+        <p:txBody>
+          <a:bodyPr spcFirstLastPara="1" wrap="square" lIns="91425" tIns="91425" rIns="91425" bIns="91425" anchor="ctr" anchorCtr="0">
+            <a:noAutofit/>
+          </a:bodyPr>
+          <a:lstStyle/>
+          <a:p>
+            <a:pPr marL="0" lvl="0" indent="0" algn="ctr" rtl="0">
+              <a:spcBef>
+                <a:spcPts val="0"/>
+              </a:spcBef>
+              <a:spcAft>
+                <a:spcPts val="0"/>
+              </a:spcAft>
+              <a:buNone/>
+            </a:pPr>
+            <a:r>
+              <a:rPr lang="en-US" sz="6000">
+                <a:solidFill>
+                  <a:srgbClr val="E6E6E6"/>
+                </a:solidFill>
+              </a:rPr>
+              <a:t>4</a:t>
+            </a:r>
+            <a:endParaRPr sz="6000">
+              <a:solidFill>
+                <a:srgbClr val="E6E6E6"/>
+              </a:solidFill>
+            </a:endParaRPr>
+          </a:p>
+          <a:p>
+            <a:r>
+              <a:rPr lang="en-US"/>
+              <a:t>Scikit-learn</a:t>
+            </a:r>
+            <a:endParaRPr/>
+          </a:p>
+        </p:txBody>
+      </p:sp>
+      <p:sp>
+        <p:nvSpPr>
+          <p:cNvPr id="99" name="Google Shape;99;p15"/>
+          <p:cNvSpPr txBox="1">
+            <a:spLocks noGrp="1"/>
+          </p:cNvSpPr>
+          <p:nvPr>
+            <p:ph type="sldNum" idx="4294967295"/>
+          </p:nvPr>
+        </p:nvSpPr>
+        <p:spPr>
+          <a:xfrm>
+            <a:off x="8404384" y="4749851"/>
+            <a:ext cx="548700" cy="393600"/>
+          </a:xfrm>
+          <a:prstGeom prst="rect">
+            <a:avLst/>
+          </a:prstGeom>
+        </p:spPr>
+        <p:txBody>
+          <a:bodyPr spcFirstLastPara="1" wrap="square" lIns="91425" tIns="91425" rIns="91425" bIns="91425" anchor="t" anchorCtr="0">
+            <a:noAutofit/>
+          </a:bodyPr>
+          <a:lstStyle/>
+          <a:p>
+            <a:pPr marL="0" lvl="0" indent="0" algn="r" rtl="0">
+              <a:spcBef>
+                <a:spcPts val="0"/>
+              </a:spcBef>
+              <a:spcAft>
+                <a:spcPts val="0"/>
+              </a:spcAft>
+              <a:buNone/>
+            </a:pPr>
+            <a:fld id="{00000000-1234-1234-1234-123412341234}" type="slidenum">
+              <a:rPr lang="en"/>
+              <a:t>10</a:t>
+            </a:fld>
+            <a:endParaRPr/>
+          </a:p>
+        </p:txBody>
+      </p:sp>
+    </p:spTree>
+    <p:extLst>
+      <p:ext uri="{BB962C8B-B14F-4D97-AF65-F5344CB8AC3E}">
+        <p14:creationId xmlns:p14="http://schemas.microsoft.com/office/powerpoint/2010/main" val="2239011547"/>
+      </p:ext>
+    </p:extLst>
+  </p:cSld>
+  <p:clrMapOvr>
+    <a:masterClrMapping/>
+  </p:clrMapOvr>
+</p:sld>
+</file>
+
+<file path=ppt/slides/slide11.xml><?xml version="1.0" encoding="utf-8"?>
+<p:sld xmlns:a="http://schemas.openxmlformats.org/drawingml/2006/main" xmlns:r="http://schemas.openxmlformats.org/officeDocument/2006/relationships" xmlns:p="http://schemas.openxmlformats.org/presentationml/2006/main">
+  <p:cSld>
+    <p:spTree>
+      <p:nvGrpSpPr>
         <p:cNvPr id="1" name="Shape 402"/>
         <p:cNvGrpSpPr/>
         <p:nvPr/>
@@ -11357,7 +11596,7 @@
             </a:pPr>
             <a:fld id="{00000000-1234-1234-1234-123412341234}" type="slidenum">
               <a:rPr lang="en"/>
-              <a:t>10</a:t>
+              <a:t>11</a:t>
             </a:fld>
             <a:endParaRPr/>
           </a:p>
@@ -11428,6 +11667,135 @@
                   <a:srgbClr val="E6E6E6"/>
                 </a:solidFill>
               </a:rPr>
+              <a:t>0</a:t>
+            </a:r>
+            <a:endParaRPr sz="6000">
+              <a:solidFill>
+                <a:srgbClr val="E6E6E6"/>
+              </a:solidFill>
+            </a:endParaRPr>
+          </a:p>
+          <a:p>
+            <a:r>
+              <a:rPr lang="en-US" b="1"/>
+              <a:t>Introduction</a:t>
+            </a:r>
+            <a:endParaRPr lang="en-US"/>
+          </a:p>
+        </p:txBody>
+      </p:sp>
+      <p:sp>
+        <p:nvSpPr>
+          <p:cNvPr id="99" name="Google Shape;99;p15"/>
+          <p:cNvSpPr txBox="1">
+            <a:spLocks noGrp="1"/>
+          </p:cNvSpPr>
+          <p:nvPr>
+            <p:ph type="sldNum" idx="4294967295"/>
+          </p:nvPr>
+        </p:nvSpPr>
+        <p:spPr>
+          <a:xfrm>
+            <a:off x="8404384" y="4749851"/>
+            <a:ext cx="548700" cy="393600"/>
+          </a:xfrm>
+          <a:prstGeom prst="rect">
+            <a:avLst/>
+          </a:prstGeom>
+        </p:spPr>
+        <p:txBody>
+          <a:bodyPr spcFirstLastPara="1" wrap="square" lIns="91425" tIns="91425" rIns="91425" bIns="91425" anchor="t" anchorCtr="0">
+            <a:noAutofit/>
+          </a:bodyPr>
+          <a:lstStyle/>
+          <a:p>
+            <a:pPr marL="0" lvl="0" indent="0" algn="r" rtl="0">
+              <a:spcBef>
+                <a:spcPts val="0"/>
+              </a:spcBef>
+              <a:spcAft>
+                <a:spcPts val="0"/>
+              </a:spcAft>
+              <a:buNone/>
+            </a:pPr>
+            <a:fld id="{00000000-1234-1234-1234-123412341234}" type="slidenum">
+              <a:rPr lang="en"/>
+              <a:t>2</a:t>
+            </a:fld>
+            <a:endParaRPr/>
+          </a:p>
+        </p:txBody>
+      </p:sp>
+    </p:spTree>
+    <p:extLst>
+      <p:ext uri="{BB962C8B-B14F-4D97-AF65-F5344CB8AC3E}">
+        <p14:creationId xmlns:p14="http://schemas.microsoft.com/office/powerpoint/2010/main" val="1478024701"/>
+      </p:ext>
+    </p:extLst>
+  </p:cSld>
+  <p:clrMapOvr>
+    <a:masterClrMapping/>
+  </p:clrMapOvr>
+</p:sld>
+</file>
+
+<file path=ppt/slides/slide3.xml><?xml version="1.0" encoding="utf-8"?>
+<p:sld xmlns:a="http://schemas.openxmlformats.org/drawingml/2006/main" xmlns:r="http://schemas.openxmlformats.org/officeDocument/2006/relationships" xmlns:p="http://schemas.openxmlformats.org/presentationml/2006/main">
+  <p:cSld>
+    <p:spTree>
+      <p:nvGrpSpPr>
+        <p:cNvPr id="1" name="Shape 96"/>
+        <p:cNvGrpSpPr/>
+        <p:nvPr/>
+      </p:nvGrpSpPr>
+      <p:grpSpPr>
+        <a:xfrm>
+          <a:off x="0" y="0"/>
+          <a:ext cx="0" cy="0"/>
+          <a:chOff x="0" y="0"/>
+          <a:chExt cx="0" cy="0"/>
+        </a:xfrm>
+      </p:grpSpPr>
+      <p:sp>
+        <p:nvSpPr>
+          <p:cNvPr id="97" name="Google Shape;97;p15"/>
+          <p:cNvSpPr txBox="1">
+            <a:spLocks noGrp="1"/>
+          </p:cNvSpPr>
+          <p:nvPr>
+            <p:ph type="ctrTitle"/>
+          </p:nvPr>
+        </p:nvSpPr>
+        <p:spPr>
+          <a:xfrm>
+            <a:off x="1655700" y="1991850"/>
+            <a:ext cx="5832600" cy="1159800"/>
+          </a:xfrm>
+          <a:prstGeom prst="rect">
+            <a:avLst/>
+          </a:prstGeom>
+        </p:spPr>
+        <p:txBody>
+          <a:bodyPr spcFirstLastPara="1" wrap="square" lIns="91425" tIns="91425" rIns="91425" bIns="91425" anchor="ctr" anchorCtr="0">
+            <a:noAutofit/>
+          </a:bodyPr>
+          <a:lstStyle/>
+          <a:p>
+            <a:pPr marL="0" lvl="0" indent="0" algn="ctr" rtl="0">
+              <a:spcBef>
+                <a:spcPts val="0"/>
+              </a:spcBef>
+              <a:spcAft>
+                <a:spcPts val="0"/>
+              </a:spcAft>
+              <a:buNone/>
+            </a:pPr>
+            <a:r>
+              <a:rPr lang="en-US" sz="6000">
+                <a:solidFill>
+                  <a:srgbClr val="E6E6E6"/>
+                </a:solidFill>
+              </a:rPr>
               <a:t>1</a:t>
             </a:r>
             <a:endParaRPr sz="6000">
@@ -11481,7 +11849,7 @@
             </a:pPr>
             <a:fld id="{00000000-1234-1234-1234-123412341234}" type="slidenum">
               <a:rPr lang="en"/>
-              <a:t>2</a:t>
+              <a:t>3</a:t>
             </a:fld>
             <a:endParaRPr/>
           </a:p>
@@ -11490,7 +11858,7 @@
     </p:spTree>
     <p:extLst>
       <p:ext uri="{BB962C8B-B14F-4D97-AF65-F5344CB8AC3E}">
-        <p14:creationId xmlns:p14="http://schemas.microsoft.com/office/powerpoint/2010/main" val="1478024701"/>
+        <p14:creationId xmlns:p14="http://schemas.microsoft.com/office/powerpoint/2010/main" val="2573329746"/>
       </p:ext>
     </p:extLst>
   </p:cSld>
@@ -11500,7 +11868,7 @@
 </p:sld>
 </file>
 
-<file path=ppt/slides/slide3.xml><?xml version="1.0" encoding="utf-8"?>
+<file path=ppt/slides/slide4.xml><?xml version="1.0" encoding="utf-8"?>
 <p:sld xmlns:a="http://schemas.openxmlformats.org/drawingml/2006/main" xmlns:r="http://schemas.openxmlformats.org/officeDocument/2006/relationships" xmlns:p="http://schemas.openxmlformats.org/presentationml/2006/main">
   <p:cSld>
     <p:spTree>
@@ -11735,7 +12103,7 @@
             </a:pPr>
             <a:fld id="{00000000-1234-1234-1234-123412341234}" type="slidenum">
               <a:rPr lang="en" smtClean="0"/>
-              <a:t>3</a:t>
+              <a:t>4</a:t>
             </a:fld>
             <a:endParaRPr lang="en"/>
           </a:p>
@@ -11754,7 +12122,7 @@
 </p:sld>
 </file>
 
-<file path=ppt/slides/slide4.xml><?xml version="1.0" encoding="utf-8"?>
+<file path=ppt/slides/slide5.xml><?xml version="1.0" encoding="utf-8"?>
 <p:sld xmlns:a="http://schemas.openxmlformats.org/drawingml/2006/main" xmlns:r="http://schemas.openxmlformats.org/officeDocument/2006/relationships" xmlns:p="http://schemas.openxmlformats.org/presentationml/2006/main">
   <p:cSld>
     <p:spTree>
@@ -12071,7 +12439,7 @@
             </a:pPr>
             <a:fld id="{00000000-1234-1234-1234-123412341234}" type="slidenum">
               <a:rPr lang="en" smtClean="0"/>
-              <a:t>4</a:t>
+              <a:t>5</a:t>
             </a:fld>
             <a:endParaRPr lang="en"/>
           </a:p>
@@ -12090,7 +12458,7 @@
 </p:sld>
 </file>
 
-<file path=ppt/slides/slide5.xml><?xml version="1.0" encoding="utf-8"?>
+<file path=ppt/slides/slide6.xml><?xml version="1.0" encoding="utf-8"?>
 <p:sld xmlns:a="http://schemas.openxmlformats.org/drawingml/2006/main" xmlns:r="http://schemas.openxmlformats.org/officeDocument/2006/relationships" xmlns:p="http://schemas.openxmlformats.org/presentationml/2006/main">
   <p:cSld>
     <p:spTree>
@@ -12373,7 +12741,7 @@
             </a:pPr>
             <a:fld id="{00000000-1234-1234-1234-123412341234}" type="slidenum">
               <a:rPr lang="en" smtClean="0"/>
-              <a:t>5</a:t>
+              <a:t>6</a:t>
             </a:fld>
             <a:endParaRPr lang="en"/>
           </a:p>
@@ -12420,7 +12788,7 @@
 </p:sld>
 </file>
 
-<file path=ppt/slides/slide6.xml><?xml version="1.0" encoding="utf-8"?>
+<file path=ppt/slides/slide7.xml><?xml version="1.0" encoding="utf-8"?>
 <p:sld xmlns:a="http://schemas.openxmlformats.org/drawingml/2006/main" xmlns:r="http://schemas.openxmlformats.org/officeDocument/2006/relationships" xmlns:p="http://schemas.openxmlformats.org/presentationml/2006/main">
   <p:cSld>
     <p:spTree>
@@ -12637,7 +13005,7 @@
             </a:pPr>
             <a:fld id="{00000000-1234-1234-1234-123412341234}" type="slidenum">
               <a:rPr lang="en" smtClean="0"/>
-              <a:t>6</a:t>
+              <a:t>7</a:t>
             </a:fld>
             <a:endParaRPr lang="en"/>
           </a:p>
@@ -12647,135 +13015,6 @@
     <p:extLst>
       <p:ext uri="{BB962C8B-B14F-4D97-AF65-F5344CB8AC3E}">
         <p14:creationId xmlns:p14="http://schemas.microsoft.com/office/powerpoint/2010/main" val="3800470615"/>
-      </p:ext>
-    </p:extLst>
-  </p:cSld>
-  <p:clrMapOvr>
-    <a:masterClrMapping/>
-  </p:clrMapOvr>
-</p:sld>
-</file>
-
-<file path=ppt/slides/slide7.xml><?xml version="1.0" encoding="utf-8"?>
-<p:sld xmlns:a="http://schemas.openxmlformats.org/drawingml/2006/main" xmlns:r="http://schemas.openxmlformats.org/officeDocument/2006/relationships" xmlns:p="http://schemas.openxmlformats.org/presentationml/2006/main">
-  <p:cSld>
-    <p:spTree>
-      <p:nvGrpSpPr>
-        <p:cNvPr id="1" name="Shape 96"/>
-        <p:cNvGrpSpPr/>
-        <p:nvPr/>
-      </p:nvGrpSpPr>
-      <p:grpSpPr>
-        <a:xfrm>
-          <a:off x="0" y="0"/>
-          <a:ext cx="0" cy="0"/>
-          <a:chOff x="0" y="0"/>
-          <a:chExt cx="0" cy="0"/>
-        </a:xfrm>
-      </p:grpSpPr>
-      <p:sp>
-        <p:nvSpPr>
-          <p:cNvPr id="97" name="Google Shape;97;p15"/>
-          <p:cNvSpPr txBox="1">
-            <a:spLocks noGrp="1"/>
-          </p:cNvSpPr>
-          <p:nvPr>
-            <p:ph type="ctrTitle"/>
-          </p:nvPr>
-        </p:nvSpPr>
-        <p:spPr>
-          <a:xfrm>
-            <a:off x="1655700" y="1991850"/>
-            <a:ext cx="5832600" cy="1159800"/>
-          </a:xfrm>
-          <a:prstGeom prst="rect">
-            <a:avLst/>
-          </a:prstGeom>
-        </p:spPr>
-        <p:txBody>
-          <a:bodyPr spcFirstLastPara="1" wrap="square" lIns="91425" tIns="91425" rIns="91425" bIns="91425" anchor="ctr" anchorCtr="0">
-            <a:noAutofit/>
-          </a:bodyPr>
-          <a:lstStyle/>
-          <a:p>
-            <a:pPr marL="0" lvl="0" indent="0" algn="ctr" rtl="0">
-              <a:spcBef>
-                <a:spcPts val="0"/>
-              </a:spcBef>
-              <a:spcAft>
-                <a:spcPts val="0"/>
-              </a:spcAft>
-              <a:buNone/>
-            </a:pPr>
-            <a:r>
-              <a:rPr lang="en-US" sz="6000">
-                <a:solidFill>
-                  <a:srgbClr val="E6E6E6"/>
-                </a:solidFill>
-              </a:rPr>
-              <a:t>2</a:t>
-            </a:r>
-            <a:endParaRPr sz="6000">
-              <a:solidFill>
-                <a:srgbClr val="E6E6E6"/>
-              </a:solidFill>
-            </a:endParaRPr>
-          </a:p>
-          <a:p>
-            <a:r>
-              <a:rPr lang="en-US" b="1"/>
-              <a:t>Pandas</a:t>
-            </a:r>
-            <a:endParaRPr/>
-          </a:p>
-        </p:txBody>
-      </p:sp>
-      <p:sp>
-        <p:nvSpPr>
-          <p:cNvPr id="99" name="Google Shape;99;p15"/>
-          <p:cNvSpPr txBox="1">
-            <a:spLocks noGrp="1"/>
-          </p:cNvSpPr>
-          <p:nvPr>
-            <p:ph type="sldNum" idx="4294967295"/>
-          </p:nvPr>
-        </p:nvSpPr>
-        <p:spPr>
-          <a:xfrm>
-            <a:off x="8404384" y="4749851"/>
-            <a:ext cx="548700" cy="393600"/>
-          </a:xfrm>
-          <a:prstGeom prst="rect">
-            <a:avLst/>
-          </a:prstGeom>
-        </p:spPr>
-        <p:txBody>
-          <a:bodyPr spcFirstLastPara="1" wrap="square" lIns="91425" tIns="91425" rIns="91425" bIns="91425" anchor="t" anchorCtr="0">
-            <a:noAutofit/>
-          </a:bodyPr>
-          <a:lstStyle/>
-          <a:p>
-            <a:pPr marL="0" lvl="0" indent="0" algn="r" rtl="0">
-              <a:spcBef>
-                <a:spcPts val="0"/>
-              </a:spcBef>
-              <a:spcAft>
-                <a:spcPts val="0"/>
-              </a:spcAft>
-              <a:buNone/>
-            </a:pPr>
-            <a:fld id="{00000000-1234-1234-1234-123412341234}" type="slidenum">
-              <a:rPr lang="en"/>
-              <a:t>7</a:t>
-            </a:fld>
-            <a:endParaRPr/>
-          </a:p>
-        </p:txBody>
-      </p:sp>
-    </p:spTree>
-    <p:extLst>
-      <p:ext uri="{BB962C8B-B14F-4D97-AF65-F5344CB8AC3E}">
-        <p14:creationId xmlns:p14="http://schemas.microsoft.com/office/powerpoint/2010/main" val="445305485"/>
       </p:ext>
     </p:extLst>
   </p:cSld>
@@ -12842,7 +13081,7 @@
                   <a:srgbClr val="E6E6E6"/>
                 </a:solidFill>
               </a:rPr>
-              <a:t>3</a:t>
+              <a:t>2</a:t>
             </a:r>
             <a:endParaRPr sz="6000">
               <a:solidFill>
@@ -12852,8 +13091,8 @@
           </a:p>
           <a:p>
             <a:r>
-              <a:rPr lang="en"/>
-              <a:t>Matplotlib</a:t>
+              <a:rPr lang="en-US" b="1"/>
+              <a:t>Pandas</a:t>
             </a:r>
             <a:endParaRPr/>
           </a:p>
@@ -12904,7 +13143,7 @@
     </p:spTree>
     <p:extLst>
       <p:ext uri="{BB962C8B-B14F-4D97-AF65-F5344CB8AC3E}">
-        <p14:creationId xmlns:p14="http://schemas.microsoft.com/office/powerpoint/2010/main" val="550571345"/>
+        <p14:creationId xmlns:p14="http://schemas.microsoft.com/office/powerpoint/2010/main" val="445305485"/>
       </p:ext>
     </p:extLst>
   </p:cSld>
@@ -12971,7 +13210,7 @@
                   <a:srgbClr val="E6E6E6"/>
                 </a:solidFill>
               </a:rPr>
-              <a:t>4</a:t>
+              <a:t>3</a:t>
             </a:r>
             <a:endParaRPr sz="6000">
               <a:solidFill>
@@ -12981,8 +13220,8 @@
           </a:p>
           <a:p>
             <a:r>
-              <a:rPr lang="en-US"/>
-              <a:t>Scikit-learn</a:t>
+              <a:rPr lang="en"/>
+              <a:t>Matplotlib</a:t>
             </a:r>
             <a:endParaRPr/>
           </a:p>
@@ -13033,7 +13272,7 @@
     </p:spTree>
     <p:extLst>
       <p:ext uri="{BB962C8B-B14F-4D97-AF65-F5344CB8AC3E}">
-        <p14:creationId xmlns:p14="http://schemas.microsoft.com/office/powerpoint/2010/main" val="2239011547"/>
+        <p14:creationId xmlns:p14="http://schemas.microsoft.com/office/powerpoint/2010/main" val="550571345"/>
       </p:ext>
     </p:extLst>
   </p:cSld>

</xml_diff>